<commit_message>
noticed that Lecture 7 had some new files
</commit_message>
<xml_diff>
--- a/Lecture 7/lecture7.pptx
+++ b/Lecture 7/lecture7.pptx
@@ -141,7 +141,7 @@
   </p:defaultTextStyle>
   <p:extLst>
     <p:ext uri="{EFAFB233-063F-42B5-8137-9DF3F51BA10A}">
-      <p15:sldGuideLst xmlns:p15="http://schemas.microsoft.com/office/powerpoint/2012/main" xmlns="">
+      <p15:sldGuideLst xmlns="" xmlns:p15="http://schemas.microsoft.com/office/powerpoint/2012/main">
         <p15:guide id="1" orient="horz" pos="2160" userDrawn="1">
           <p15:clr>
             <a:srgbClr val="A4A3A4"/>
@@ -155,7 +155,7 @@
       </p15:sldGuideLst>
     </p:ext>
     <p:ext uri="{2D200454-40CA-4A62-9FC3-DE9A4176ACB9}">
-      <p15:notesGuideLst xmlns:p15="http://schemas.microsoft.com/office/powerpoint/2012/main" xmlns="">
+      <p15:notesGuideLst xmlns="" xmlns:p15="http://schemas.microsoft.com/office/powerpoint/2012/main">
         <p15:guide id="1" orient="horz" pos="2880">
           <p15:clr>
             <a:srgbClr val="A4A3A4"/>
@@ -5215,7 +5215,7 @@
             <a:fld id="{B4B40DF5-17F0-43C5-A7AE-65A758E8AB63}" type="datetimeFigureOut">
               <a:rPr lang="nl-NL" smtClean="0"/>
               <a:pPr/>
-              <a:t>3/17/21</a:t>
+              <a:t>3/24/21</a:t>
             </a:fld>
             <a:endParaRPr lang="nl-NL"/>
           </a:p>
@@ -5381,7 +5381,7 @@
           <a:p>
             <a:fld id="{A93D6BD4-2A44-460F-8349-CDAFC499EC45}" type="datetimeFigureOut">
               <a:rPr lang="en-US" smtClean="0"/>
-              <a:t>3/17/21</a:t>
+              <a:t>3/24/21</a:t>
             </a:fld>
             <a:endParaRPr lang="en-US"/>
           </a:p>
@@ -8534,14 +8534,14 @@
                 <a:gridCol w="2812093">
                   <a:extLst>
                     <a:ext uri="{9D8B030D-6E8A-4147-A177-3AD203B41FA5}">
-                      <a16:colId xmlns:a16="http://schemas.microsoft.com/office/drawing/2014/main" xmlns="" val="20000"/>
+                      <a16:colId xmlns="" xmlns:a16="http://schemas.microsoft.com/office/drawing/2014/main" val="20000"/>
                     </a:ext>
                   </a:extLst>
                 </a:gridCol>
                 <a:gridCol w="9379907">
                   <a:extLst>
                     <a:ext uri="{9D8B030D-6E8A-4147-A177-3AD203B41FA5}">
-                      <a16:colId xmlns:a16="http://schemas.microsoft.com/office/drawing/2014/main" xmlns="" val="20001"/>
+                      <a16:colId xmlns="" xmlns:a16="http://schemas.microsoft.com/office/drawing/2014/main" val="20001"/>
                     </a:ext>
                   </a:extLst>
                 </a:gridCol>
@@ -8617,7 +8617,7 @@
                 </a:tc>
                 <a:extLst>
                   <a:ext uri="{0D108BD9-81ED-4DB2-BD59-A6C34878D82A}">
-                    <a16:rowId xmlns:a16="http://schemas.microsoft.com/office/drawing/2014/main" xmlns="" val="10000"/>
+                    <a16:rowId xmlns="" xmlns:a16="http://schemas.microsoft.com/office/drawing/2014/main" val="10000"/>
                   </a:ext>
                 </a:extLst>
               </a:tr>
@@ -8707,7 +8707,7 @@
                 </a:tc>
                 <a:extLst>
                   <a:ext uri="{0D108BD9-81ED-4DB2-BD59-A6C34878D82A}">
-                    <a16:rowId xmlns:a16="http://schemas.microsoft.com/office/drawing/2014/main" xmlns="" val="10001"/>
+                    <a16:rowId xmlns="" xmlns:a16="http://schemas.microsoft.com/office/drawing/2014/main" val="10001"/>
                   </a:ext>
                 </a:extLst>
               </a:tr>
@@ -8792,7 +8792,7 @@
                 </a:tc>
                 <a:extLst>
                   <a:ext uri="{0D108BD9-81ED-4DB2-BD59-A6C34878D82A}">
-                    <a16:rowId xmlns:a16="http://schemas.microsoft.com/office/drawing/2014/main" xmlns="" val="10002"/>
+                    <a16:rowId xmlns="" xmlns:a16="http://schemas.microsoft.com/office/drawing/2014/main" val="10002"/>
                   </a:ext>
                 </a:extLst>
               </a:tr>
@@ -8882,7 +8882,7 @@
                 </a:tc>
                 <a:extLst>
                   <a:ext uri="{0D108BD9-81ED-4DB2-BD59-A6C34878D82A}">
-                    <a16:rowId xmlns:a16="http://schemas.microsoft.com/office/drawing/2014/main" xmlns="" val="10003"/>
+                    <a16:rowId xmlns="" xmlns:a16="http://schemas.microsoft.com/office/drawing/2014/main" val="10003"/>
                   </a:ext>
                 </a:extLst>
               </a:tr>
@@ -8972,7 +8972,7 @@
                 </a:tc>
                 <a:extLst>
                   <a:ext uri="{0D108BD9-81ED-4DB2-BD59-A6C34878D82A}">
-                    <a16:rowId xmlns:a16="http://schemas.microsoft.com/office/drawing/2014/main" xmlns="" val="10004"/>
+                    <a16:rowId xmlns="" xmlns:a16="http://schemas.microsoft.com/office/drawing/2014/main" val="10004"/>
                   </a:ext>
                 </a:extLst>
               </a:tr>
@@ -9066,7 +9066,7 @@
                 </a:tc>
                 <a:extLst>
                   <a:ext uri="{0D108BD9-81ED-4DB2-BD59-A6C34878D82A}">
-                    <a16:rowId xmlns:a16="http://schemas.microsoft.com/office/drawing/2014/main" xmlns="" val="10005"/>
+                    <a16:rowId xmlns="" xmlns:a16="http://schemas.microsoft.com/office/drawing/2014/main" val="10005"/>
                   </a:ext>
                 </a:extLst>
               </a:tr>
@@ -9173,7 +9173,7 @@
                 </a:tc>
                 <a:extLst>
                   <a:ext uri="{0D108BD9-81ED-4DB2-BD59-A6C34878D82A}">
-                    <a16:rowId xmlns:a16="http://schemas.microsoft.com/office/drawing/2014/main" xmlns="" val="10006"/>
+                    <a16:rowId xmlns="" xmlns:a16="http://schemas.microsoft.com/office/drawing/2014/main" val="10006"/>
                   </a:ext>
                 </a:extLst>
               </a:tr>
@@ -9280,7 +9280,7 @@
                 </a:tc>
                 <a:extLst>
                   <a:ext uri="{0D108BD9-81ED-4DB2-BD59-A6C34878D82A}">
-                    <a16:rowId xmlns:a16="http://schemas.microsoft.com/office/drawing/2014/main" xmlns="" val="10007"/>
+                    <a16:rowId xmlns="" xmlns:a16="http://schemas.microsoft.com/office/drawing/2014/main" val="10007"/>
                   </a:ext>
                 </a:extLst>
               </a:tr>
@@ -9423,7 +9423,7 @@
                 </a:tc>
                 <a:extLst>
                   <a:ext uri="{0D108BD9-81ED-4DB2-BD59-A6C34878D82A}">
-                    <a16:rowId xmlns:a16="http://schemas.microsoft.com/office/drawing/2014/main" xmlns="" val="2996243846"/>
+                    <a16:rowId xmlns="" xmlns:a16="http://schemas.microsoft.com/office/drawing/2014/main" val="2996243846"/>
                   </a:ext>
                 </a:extLst>
               </a:tr>
@@ -9529,7 +9529,7 @@
                 </a:tc>
                 <a:extLst>
                   <a:ext uri="{0D108BD9-81ED-4DB2-BD59-A6C34878D82A}">
-                    <a16:rowId xmlns:a16="http://schemas.microsoft.com/office/drawing/2014/main" xmlns="" val="2596393298"/>
+                    <a16:rowId xmlns="" xmlns:a16="http://schemas.microsoft.com/office/drawing/2014/main" val="2596393298"/>
                   </a:ext>
                 </a:extLst>
               </a:tr>
@@ -9651,7 +9651,7 @@
                 </a:tc>
                 <a:extLst>
                   <a:ext uri="{0D108BD9-81ED-4DB2-BD59-A6C34878D82A}">
-                    <a16:rowId xmlns:a16="http://schemas.microsoft.com/office/drawing/2014/main" xmlns="" val="195954885"/>
+                    <a16:rowId xmlns="" xmlns:a16="http://schemas.microsoft.com/office/drawing/2014/main" val="195954885"/>
                   </a:ext>
                 </a:extLst>
               </a:tr>
@@ -11786,12 +11786,18 @@
           <a:p>
             <a:r>
               <a:rPr lang="en-US" sz="1600" dirty="0" smtClean="0">
+                <a:solidFill>
+                  <a:srgbClr val="FFFF00"/>
+                </a:solidFill>
                 <a:latin typeface="Courier New" panose="02070309020205020404" pitchFamily="49" charset="0"/>
                 <a:cs typeface="Courier New" panose="02070309020205020404" pitchFamily="49" charset="0"/>
               </a:rPr>
               <a:t>This might be used in single page applications (made in React), to easily redirect user. He only used it native mobile applications</a:t>
             </a:r>
             <a:endParaRPr lang="en-US" sz="1600" dirty="0">
+              <a:solidFill>
+                <a:srgbClr val="FFFF00"/>
+              </a:solidFill>
               <a:latin typeface="Courier New" panose="02070309020205020404" pitchFamily="49" charset="0"/>
               <a:cs typeface="Courier New" panose="02070309020205020404" pitchFamily="49" charset="0"/>
             </a:endParaRPr>
@@ -13106,8 +13112,38 @@
                   </a:schemeClr>
                 </a:solidFill>
               </a:rPr>
-              <a:t>Name of the new window, which can be used as the value of a form's target attribute</a:t>
-            </a:r>
+              <a:t>Name of the new window, which can be used as the value of a form's target </a:t>
+            </a:r>
+            <a:r>
+              <a:rPr lang="en-US" sz="1600" dirty="0" smtClean="0">
+                <a:solidFill>
+                  <a:schemeClr val="bg2">
+                    <a:lumMod val="40000"/>
+                    <a:lumOff val="60000"/>
+                  </a:schemeClr>
+                </a:solidFill>
+              </a:rPr>
+              <a:t>attribute. </a:t>
+            </a:r>
+            <a:r>
+              <a:rPr lang="en-US" sz="1200" dirty="0" smtClean="0">
+                <a:solidFill>
+                  <a:schemeClr val="bg2">
+                    <a:lumMod val="40000"/>
+                    <a:lumOff val="60000"/>
+                  </a:schemeClr>
+                </a:solidFill>
+              </a:rPr>
+              <a:t>THIS NAME IS DIFFERENT FROM THE TITLE OF THE NEW WINDOW. IF THE NAME MATCHES AN EXISTING WINDOW, THE URL LOADS IN THAT WINDOW.</a:t>
+            </a:r>
+            <a:endParaRPr lang="en-US" sz="1200" dirty="0">
+              <a:solidFill>
+                <a:schemeClr val="bg2">
+                  <a:lumMod val="40000"/>
+                  <a:lumOff val="60000"/>
+                </a:schemeClr>
+              </a:solidFill>
+            </a:endParaRPr>
           </a:p>
           <a:p>
             <a:pPr marL="400050" indent="-400050">
@@ -13981,8 +14017,41 @@
             </a:br>
             <a:r>
               <a:rPr lang="en-US" sz="1600" dirty="0"/>
-              <a:t>Moves the browser window to screen location x = 100 and y = 100 (counted from the top-left corner).</a:t>
-            </a:r>
+              <a:t>Moves the browser window to screen location x = 100 and y = 100 (counted from the top-left corner)</a:t>
+            </a:r>
+            <a:r>
+              <a:rPr lang="en-US" sz="1600" dirty="0" smtClean="0"/>
+              <a:t>. </a:t>
+            </a:r>
+            <a:r>
+              <a:rPr lang="en-US" sz="1600" dirty="0" smtClean="0">
+                <a:solidFill>
+                  <a:srgbClr val="FFFF00"/>
+                </a:solidFill>
+              </a:rPr>
+              <a:t>So </a:t>
+            </a:r>
+            <a:r>
+              <a:rPr lang="en-US" sz="1600" dirty="0" err="1" smtClean="0">
+                <a:solidFill>
+                  <a:srgbClr val="FFFF00"/>
+                </a:solidFill>
+              </a:rPr>
+              <a:t>window.moveTo</a:t>
+            </a:r>
+            <a:r>
+              <a:rPr lang="en-US" sz="1600" dirty="0" smtClean="0">
+                <a:solidFill>
+                  <a:srgbClr val="FFFF00"/>
+                </a:solidFill>
+              </a:rPr>
+              <a:t>(0,0) would move the (top left corner of the) window to the top left corner of the screen.</a:t>
+            </a:r>
+            <a:endParaRPr lang="en-US" sz="1600" dirty="0">
+              <a:solidFill>
+                <a:srgbClr val="FFFF00"/>
+              </a:solidFill>
+            </a:endParaRPr>
           </a:p>
           <a:p>
             <a:pPr marL="400050" indent="-400050">
@@ -15247,23 +15316,7 @@
                   <a:srgbClr val="FFFF00"/>
                 </a:solidFill>
               </a:rPr>
-              <a:t>Document is </a:t>
-            </a:r>
-            <a:r>
-              <a:rPr lang="en-US" sz="1600" dirty="0" smtClean="0">
-                <a:solidFill>
-                  <a:srgbClr val="FFFF00"/>
-                </a:solidFill>
-              </a:rPr>
-              <a:t>contained within window object. </a:t>
-            </a:r>
-            <a:r>
-              <a:rPr lang="en-US" sz="1600" dirty="0" smtClean="0">
-                <a:solidFill>
-                  <a:srgbClr val="FFFF00"/>
-                </a:solidFill>
-              </a:rPr>
-              <a:t>Text boxes, drop down lists, etc.</a:t>
+              <a:t>Document is contained within window object. Text boxes, drop down lists, etc.</a:t>
             </a:r>
             <a:endParaRPr lang="en-US" sz="1600" dirty="0">
               <a:solidFill>
@@ -15691,36 +15744,6 @@
           </a:p>
           <a:p>
             <a:r>
-              <a:rPr lang="en-US" sz="1600" smtClean="0">
-                <a:solidFill>
-                  <a:srgbClr val="FFFF00"/>
-                </a:solidFill>
-                <a:latin typeface="Courier New" panose="02070309020205020404" pitchFamily="49" charset="0"/>
-                <a:cs typeface="Courier New" panose="02070309020205020404" pitchFamily="49" charset="0"/>
-              </a:rPr>
-              <a:t>Apparently, </a:t>
-            </a:r>
-            <a:r>
-              <a:rPr lang="en-US" sz="1600" dirty="0">
-                <a:solidFill>
-                  <a:srgbClr val="FFFF00"/>
-                </a:solidFill>
-                <a:latin typeface="Courier New" panose="02070309020205020404" pitchFamily="49" charset="0"/>
-                <a:cs typeface="Courier New" panose="02070309020205020404" pitchFamily="49" charset="0"/>
-              </a:rPr>
-              <a:t>t</a:t>
-            </a:r>
-            <a:r>
-              <a:rPr lang="en-US" sz="1600" smtClean="0">
-                <a:solidFill>
-                  <a:srgbClr val="FFFF00"/>
-                </a:solidFill>
-                <a:latin typeface="Courier New" panose="02070309020205020404" pitchFamily="49" charset="0"/>
-                <a:cs typeface="Courier New" panose="02070309020205020404" pitchFamily="49" charset="0"/>
-              </a:rPr>
-              <a:t>hough</a:t>
-            </a:r>
-            <a:r>
               <a:rPr lang="en-US" sz="1600" dirty="0" smtClean="0">
                 <a:solidFill>
                   <a:srgbClr val="FFFF00"/>
@@ -15728,7 +15751,27 @@
                 <a:latin typeface="Courier New" panose="02070309020205020404" pitchFamily="49" charset="0"/>
                 <a:cs typeface="Courier New" panose="02070309020205020404" pitchFamily="49" charset="0"/>
               </a:rPr>
-              <a:t>, you cannot do </a:t>
+              <a:t>Apparently, </a:t>
+            </a:r>
+            <a:r>
+              <a:rPr lang="en-US" sz="1600" dirty="0">
+                <a:solidFill>
+                  <a:srgbClr val="FFFF00"/>
+                </a:solidFill>
+                <a:latin typeface="Courier New" panose="02070309020205020404" pitchFamily="49" charset="0"/>
+                <a:cs typeface="Courier New" panose="02070309020205020404" pitchFamily="49" charset="0"/>
+              </a:rPr>
+              <a:t>t</a:t>
+            </a:r>
+            <a:r>
+              <a:rPr lang="en-US" sz="1600" dirty="0" smtClean="0">
+                <a:solidFill>
+                  <a:srgbClr val="FFFF00"/>
+                </a:solidFill>
+                <a:latin typeface="Courier New" panose="02070309020205020404" pitchFamily="49" charset="0"/>
+                <a:cs typeface="Courier New" panose="02070309020205020404" pitchFamily="49" charset="0"/>
+              </a:rPr>
+              <a:t>hough, you cannot do </a:t>
             </a:r>
             <a:r>
               <a:rPr lang="en-US" sz="1600" dirty="0" err="1" smtClean="0">
@@ -16790,14 +16833,7 @@
                 <a:latin typeface="Courier New" panose="02070309020205020404" pitchFamily="49" charset="0"/>
                 <a:cs typeface="Courier New" panose="02070309020205020404" pitchFamily="49" charset="0"/>
               </a:rPr>
-              <a:t>('Chrome</a:t>
-            </a:r>
-            <a:r>
-              <a:rPr lang="en-US" sz="1500" dirty="0">
-                <a:latin typeface="Courier New" panose="02070309020205020404" pitchFamily="49" charset="0"/>
-                <a:cs typeface="Courier New" panose="02070309020205020404" pitchFamily="49" charset="0"/>
-              </a:rPr>
-              <a:t>') &gt; -1) { </a:t>
+              <a:t>('Chrome') &gt; -1) { </a:t>
             </a:r>
             <a:br>
               <a:rPr lang="en-US" sz="1500" dirty="0">

</xml_diff>